<commit_message>
Fixed the link to SmashingMagazine.com
</commit_message>
<xml_diff>
--- a/How to Build Beautiful Apps.pptx
+++ b/How to Build Beautiful Apps.pptx
@@ -12541,14 +12541,14 @@
         <a:p>
           <a:pPr rtl="0"/>
           <a:r>
-            <a:rPr lang="en-US" sz="1800" dirty="0" smtClean="0">
+            <a:rPr lang="en-US" sz="1400" b="1" dirty="0" smtClean="0">
               <a:solidFill>
                 <a:schemeClr val="bg1"/>
               </a:solidFill>
             </a:rPr>
-            <a:t>http://bootsnipp.com</a:t>
+            <a:t>http://www.smashingmagazine.com/</a:t>
           </a:r>
-          <a:endParaRPr lang="en-US" sz="1800" dirty="0">
+          <a:endParaRPr lang="en-US" sz="1050" dirty="0">
             <a:solidFill>
               <a:schemeClr val="bg1"/>
             </a:solidFill>
@@ -18151,14 +18151,14 @@
             </a:spcAft>
           </a:pPr>
           <a:r>
-            <a:rPr lang="en-US" sz="1800" kern="1200" dirty="0" smtClean="0">
+            <a:rPr lang="en-US" sz="1400" b="1" kern="1200" dirty="0" smtClean="0">
               <a:solidFill>
                 <a:schemeClr val="bg1"/>
               </a:solidFill>
             </a:rPr>
-            <a:t>http://bootsnipp.com</a:t>
+            <a:t>http://www.smashingmagazine.com/</a:t>
           </a:r>
-          <a:endParaRPr lang="en-US" sz="1800" kern="1200" dirty="0">
+          <a:endParaRPr lang="en-US" sz="1050" kern="1200" dirty="0">
             <a:solidFill>
               <a:schemeClr val="bg1"/>
             </a:solidFill>
@@ -38766,7 +38766,7 @@
           <a:p>
             <a:fld id="{03249240-F891-40D9-AF76-9E7921B0AE67}" type="datetimeFigureOut">
               <a:rPr lang="en-US" smtClean="0"/>
-              <a:t>11/11/2015</a:t>
+              <a:t>11/13/2015</a:t>
             </a:fld>
             <a:endParaRPr lang="en-US"/>
           </a:p>
@@ -39150,6 +39150,90 @@
             <p:ph type="sldImg"/>
           </p:nvPr>
         </p:nvSpPr>
+        <p:spPr/>
+      </p:sp>
+      <p:sp>
+        <p:nvSpPr>
+          <p:cNvPr id="3" name="Notes Placeholder 2"/>
+          <p:cNvSpPr>
+            <a:spLocks noGrp="1"/>
+          </p:cNvSpPr>
+          <p:nvPr>
+            <p:ph type="body" idx="1"/>
+          </p:nvPr>
+        </p:nvSpPr>
+        <p:spPr/>
+        <p:txBody>
+          <a:bodyPr/>
+          <a:lstStyle/>
+          <a:p>
+            <a:endParaRPr lang="en-US" dirty="0"/>
+          </a:p>
+        </p:txBody>
+      </p:sp>
+      <p:sp>
+        <p:nvSpPr>
+          <p:cNvPr id="4" name="Slide Number Placeholder 3"/>
+          <p:cNvSpPr>
+            <a:spLocks noGrp="1"/>
+          </p:cNvSpPr>
+          <p:nvPr>
+            <p:ph type="sldNum" sz="quarter" idx="10"/>
+          </p:nvPr>
+        </p:nvSpPr>
+        <p:spPr/>
+        <p:txBody>
+          <a:bodyPr/>
+          <a:lstStyle/>
+          <a:p>
+            <a:fld id="{C77644F8-0D73-4A15-B9E8-518626CDBC48}" type="slidenum">
+              <a:rPr lang="en-US" smtClean="0"/>
+              <a:t>15</a:t>
+            </a:fld>
+            <a:endParaRPr lang="en-US"/>
+          </a:p>
+        </p:txBody>
+      </p:sp>
+    </p:spTree>
+    <p:extLst>
+      <p:ext uri="{BB962C8B-B14F-4D97-AF65-F5344CB8AC3E}">
+        <p14:creationId xmlns:p14="http://schemas.microsoft.com/office/powerpoint/2010/main" val="2122254933"/>
+      </p:ext>
+    </p:extLst>
+  </p:cSld>
+  <p:clrMapOvr>
+    <a:masterClrMapping/>
+  </p:clrMapOvr>
+</p:notes>
+</file>
+
+<file path=ppt/notesSlides/notesSlide11.xml><?xml version="1.0" encoding="utf-8"?>
+<p:notes xmlns:a="http://schemas.openxmlformats.org/drawingml/2006/main" xmlns:r="http://schemas.openxmlformats.org/officeDocument/2006/relationships" xmlns:p="http://schemas.openxmlformats.org/presentationml/2006/main">
+  <p:cSld>
+    <p:spTree>
+      <p:nvGrpSpPr>
+        <p:cNvPr id="1" name=""/>
+        <p:cNvGrpSpPr/>
+        <p:nvPr/>
+      </p:nvGrpSpPr>
+      <p:grpSpPr>
+        <a:xfrm>
+          <a:off x="0" y="0"/>
+          <a:ext cx="0" cy="0"/>
+          <a:chOff x="0" y="0"/>
+          <a:chExt cx="0" cy="0"/>
+        </a:xfrm>
+      </p:grpSpPr>
+      <p:sp>
+        <p:nvSpPr>
+          <p:cNvPr id="2" name="Slide Image Placeholder 1"/>
+          <p:cNvSpPr>
+            <a:spLocks noGrp="1" noRot="1" noChangeAspect="1"/>
+          </p:cNvSpPr>
+          <p:nvPr>
+            <p:ph type="sldImg"/>
+          </p:nvPr>
+        </p:nvSpPr>
         <p:spPr>
           <a:xfrm>
             <a:off x="685800" y="1143000"/>
@@ -39212,7 +39296,7 @@
 </p:notes>
 </file>
 
-<file path=ppt/notesSlides/notesSlide11.xml><?xml version="1.0" encoding="utf-8"?>
+<file path=ppt/notesSlides/notesSlide12.xml><?xml version="1.0" encoding="utf-8"?>
 <p:notes xmlns:a="http://schemas.openxmlformats.org/drawingml/2006/main" xmlns:r="http://schemas.openxmlformats.org/officeDocument/2006/relationships" xmlns:p="http://schemas.openxmlformats.org/presentationml/2006/main">
   <p:cSld>
     <p:spTree>
@@ -39301,7 +39385,7 @@
 </p:notes>
 </file>
 
-<file path=ppt/notesSlides/notesSlide12.xml><?xml version="1.0" encoding="utf-8"?>
+<file path=ppt/notesSlides/notesSlide13.xml><?xml version="1.0" encoding="utf-8"?>
 <p:notes xmlns:a="http://schemas.openxmlformats.org/drawingml/2006/main" xmlns:r="http://schemas.openxmlformats.org/officeDocument/2006/relationships" xmlns:p="http://schemas.openxmlformats.org/presentationml/2006/main">
   <p:cSld>
     <p:spTree>
@@ -39390,7 +39474,7 @@
 </p:notes>
 </file>
 
-<file path=ppt/notesSlides/notesSlide13.xml><?xml version="1.0" encoding="utf-8"?>
+<file path=ppt/notesSlides/notesSlide14.xml><?xml version="1.0" encoding="utf-8"?>
 <p:notes xmlns:a="http://schemas.openxmlformats.org/drawingml/2006/main" xmlns:r="http://schemas.openxmlformats.org/officeDocument/2006/relationships" xmlns:p="http://schemas.openxmlformats.org/presentationml/2006/main">
   <p:cSld>
     <p:spTree>
@@ -39479,7 +39563,7 @@
 </p:notes>
 </file>
 
-<file path=ppt/notesSlides/notesSlide14.xml><?xml version="1.0" encoding="utf-8"?>
+<file path=ppt/notesSlides/notesSlide15.xml><?xml version="1.0" encoding="utf-8"?>
 <p:notes xmlns:a="http://schemas.openxmlformats.org/drawingml/2006/main" xmlns:r="http://schemas.openxmlformats.org/officeDocument/2006/relationships" xmlns:p="http://schemas.openxmlformats.org/presentationml/2006/main">
   <p:cSld>
     <p:spTree>
@@ -39568,7 +39652,7 @@
 </p:notes>
 </file>
 
-<file path=ppt/notesSlides/notesSlide15.xml><?xml version="1.0" encoding="utf-8"?>
+<file path=ppt/notesSlides/notesSlide16.xml><?xml version="1.0" encoding="utf-8"?>
 <p:notes xmlns:a="http://schemas.openxmlformats.org/drawingml/2006/main" xmlns:r="http://schemas.openxmlformats.org/officeDocument/2006/relationships" xmlns:p="http://schemas.openxmlformats.org/presentationml/2006/main">
   <p:cSld>
     <p:spTree>
@@ -40490,7 +40574,7 @@
           <a:p>
             <a:fld id="{6581787D-5DB4-4E7C-8D16-1CDC2F1A93C0}" type="datetimeFigureOut">
               <a:rPr lang="en-US" smtClean="0"/>
-              <a:t>11/11/2015</a:t>
+              <a:t>11/13/2015</a:t>
             </a:fld>
             <a:endParaRPr lang="en-US"/>
           </a:p>
@@ -40667,7 +40751,7 @@
           <a:p>
             <a:fld id="{6581787D-5DB4-4E7C-8D16-1CDC2F1A93C0}" type="datetimeFigureOut">
               <a:rPr lang="en-US" smtClean="0"/>
-              <a:t>11/11/2015</a:t>
+              <a:t>11/13/2015</a:t>
             </a:fld>
             <a:endParaRPr lang="en-US"/>
           </a:p>
@@ -40847,7 +40931,7 @@
           <a:p>
             <a:fld id="{6581787D-5DB4-4E7C-8D16-1CDC2F1A93C0}" type="datetimeFigureOut">
               <a:rPr lang="en-US" smtClean="0"/>
-              <a:t>11/11/2015</a:t>
+              <a:t>11/13/2015</a:t>
             </a:fld>
             <a:endParaRPr lang="en-US"/>
           </a:p>
@@ -41017,7 +41101,7 @@
           <a:p>
             <a:fld id="{6581787D-5DB4-4E7C-8D16-1CDC2F1A93C0}" type="datetimeFigureOut">
               <a:rPr lang="en-US" smtClean="0"/>
-              <a:t>11/11/2015</a:t>
+              <a:t>11/13/2015</a:t>
             </a:fld>
             <a:endParaRPr lang="en-US"/>
           </a:p>
@@ -41263,7 +41347,7 @@
           <a:p>
             <a:fld id="{6581787D-5DB4-4E7C-8D16-1CDC2F1A93C0}" type="datetimeFigureOut">
               <a:rPr lang="en-US" smtClean="0"/>
-              <a:t>11/11/2015</a:t>
+              <a:t>11/13/2015</a:t>
             </a:fld>
             <a:endParaRPr lang="en-US"/>
           </a:p>
@@ -41495,7 +41579,7 @@
           <a:p>
             <a:fld id="{6581787D-5DB4-4E7C-8D16-1CDC2F1A93C0}" type="datetimeFigureOut">
               <a:rPr lang="en-US" smtClean="0"/>
-              <a:t>11/11/2015</a:t>
+              <a:t>11/13/2015</a:t>
             </a:fld>
             <a:endParaRPr lang="en-US"/>
           </a:p>
@@ -41862,7 +41946,7 @@
           <a:p>
             <a:fld id="{6581787D-5DB4-4E7C-8D16-1CDC2F1A93C0}" type="datetimeFigureOut">
               <a:rPr lang="en-US" smtClean="0"/>
-              <a:t>11/11/2015</a:t>
+              <a:t>11/13/2015</a:t>
             </a:fld>
             <a:endParaRPr lang="en-US"/>
           </a:p>
@@ -41980,7 +42064,7 @@
           <a:p>
             <a:fld id="{6581787D-5DB4-4E7C-8D16-1CDC2F1A93C0}" type="datetimeFigureOut">
               <a:rPr lang="en-US" smtClean="0"/>
-              <a:t>11/11/2015</a:t>
+              <a:t>11/13/2015</a:t>
             </a:fld>
             <a:endParaRPr lang="en-US"/>
           </a:p>
@@ -42075,7 +42159,7 @@
           <a:p>
             <a:fld id="{6581787D-5DB4-4E7C-8D16-1CDC2F1A93C0}" type="datetimeFigureOut">
               <a:rPr lang="en-US" smtClean="0"/>
-              <a:t>11/11/2015</a:t>
+              <a:t>11/13/2015</a:t>
             </a:fld>
             <a:endParaRPr lang="en-US"/>
           </a:p>
@@ -42352,7 +42436,7 @@
           <a:p>
             <a:fld id="{6581787D-5DB4-4E7C-8D16-1CDC2F1A93C0}" type="datetimeFigureOut">
               <a:rPr lang="en-US" smtClean="0"/>
-              <a:t>11/11/2015</a:t>
+              <a:t>11/13/2015</a:t>
             </a:fld>
             <a:endParaRPr lang="en-US"/>
           </a:p>
@@ -42605,7 +42689,7 @@
           <a:p>
             <a:fld id="{6581787D-5DB4-4E7C-8D16-1CDC2F1A93C0}" type="datetimeFigureOut">
               <a:rPr lang="en-US" smtClean="0"/>
-              <a:t>11/11/2015</a:t>
+              <a:t>11/13/2015</a:t>
             </a:fld>
             <a:endParaRPr lang="en-US"/>
           </a:p>
@@ -42818,7 +42902,7 @@
           <a:p>
             <a:fld id="{6581787D-5DB4-4E7C-8D16-1CDC2F1A93C0}" type="datetimeFigureOut">
               <a:rPr lang="en-US" smtClean="0"/>
-              <a:t>11/11/2015</a:t>
+              <a:t>11/13/2015</a:t>
             </a:fld>
             <a:endParaRPr lang="en-US"/>
           </a:p>
@@ -43892,8 +43976,8 @@
         </p:nvSpPr>
         <p:spPr>
           <a:xfrm>
-            <a:off x="4449042" y="4851139"/>
-            <a:ext cx="3293915" cy="369332"/>
+            <a:off x="3414048" y="4851139"/>
+            <a:ext cx="5363904" cy="369332"/>
           </a:xfrm>
           <a:prstGeom prst="rect">
             <a:avLst/>
@@ -43908,7 +43992,7 @@
           <a:p>
             <a:r>
               <a:rPr lang="en-US" dirty="0" smtClean="0"/>
-              <a:t>(it’s like CSS, but for real people!)</a:t>
+              <a:t>(it’s like CSS, but made by people that don’t hate you!!)</a:t>
             </a:r>
             <a:endParaRPr lang="en-US" dirty="0"/>
           </a:p>
@@ -44091,7 +44175,7 @@
           <p:nvPr/>
         </p:nvPicPr>
         <p:blipFill>
-          <a:blip r:embed="rId2" cstate="print">
+          <a:blip r:embed="rId3" cstate="print">
             <a:extLst>
               <a:ext uri="{28A0092B-C50C-407E-A947-70E740481C1C}">
                 <a14:useLocalDpi xmlns:a14="http://schemas.microsoft.com/office/drawing/2010/main" val="0"/>
@@ -44186,9 +44270,88 @@
   <p:timing>
     <p:tnLst>
       <p:par>
-        <p:cTn id="1" dur="indefinite" restart="never" nodeType="tmRoot"/>
+        <p:cTn id="1" dur="indefinite" restart="never" nodeType="tmRoot">
+          <p:childTnLst>
+            <p:seq concurrent="1" nextAc="seek">
+              <p:cTn id="2" dur="indefinite" nodeType="mainSeq">
+                <p:childTnLst>
+                  <p:par>
+                    <p:cTn id="3" fill="hold">
+                      <p:stCondLst>
+                        <p:cond delay="indefinite"/>
+                      </p:stCondLst>
+                      <p:childTnLst>
+                        <p:par>
+                          <p:cTn id="4" fill="hold">
+                            <p:stCondLst>
+                              <p:cond delay="0"/>
+                            </p:stCondLst>
+                            <p:childTnLst>
+                              <p:par>
+                                <p:cTn id="5" presetID="10" presetClass="entr" presetSubtype="0" fill="hold" grpId="0" nodeType="clickEffect">
+                                  <p:stCondLst>
+                                    <p:cond delay="0"/>
+                                  </p:stCondLst>
+                                  <p:childTnLst>
+                                    <p:set>
+                                      <p:cBhvr>
+                                        <p:cTn id="6" dur="1" fill="hold">
+                                          <p:stCondLst>
+                                            <p:cond delay="0"/>
+                                          </p:stCondLst>
+                                        </p:cTn>
+                                        <p:tgtEl>
+                                          <p:spTgt spid="3"/>
+                                        </p:tgtEl>
+                                        <p:attrNameLst>
+                                          <p:attrName>style.visibility</p:attrName>
+                                        </p:attrNameLst>
+                                      </p:cBhvr>
+                                      <p:to>
+                                        <p:strVal val="visible"/>
+                                      </p:to>
+                                    </p:set>
+                                    <p:animEffect transition="in" filter="fade">
+                                      <p:cBhvr>
+                                        <p:cTn id="7" dur="500"/>
+                                        <p:tgtEl>
+                                          <p:spTgt spid="3"/>
+                                        </p:tgtEl>
+                                      </p:cBhvr>
+                                    </p:animEffect>
+                                  </p:childTnLst>
+                                </p:cTn>
+                              </p:par>
+                            </p:childTnLst>
+                          </p:cTn>
+                        </p:par>
+                      </p:childTnLst>
+                    </p:cTn>
+                  </p:par>
+                </p:childTnLst>
+              </p:cTn>
+              <p:prevCondLst>
+                <p:cond evt="onPrev" delay="0">
+                  <p:tgtEl>
+                    <p:sldTgt/>
+                  </p:tgtEl>
+                </p:cond>
+              </p:prevCondLst>
+              <p:nextCondLst>
+                <p:cond evt="onNext" delay="0">
+                  <p:tgtEl>
+                    <p:sldTgt/>
+                  </p:tgtEl>
+                </p:cond>
+              </p:nextCondLst>
+            </p:seq>
+          </p:childTnLst>
+        </p:cTn>
       </p:par>
     </p:tnLst>
+    <p:bldLst>
+      <p:bldP spid="3" grpId="0"/>
+    </p:bldLst>
   </p:timing>
 </p:sld>
 </file>
@@ -48704,7 +48867,27 @@
                   </a:schemeClr>
                 </a:solidFill>
               </a:rPr>
-              <a:t>help you create apps that look like you had some design sense</a:t>
+              <a:t>help you </a:t>
+            </a:r>
+            <a:r>
+              <a:rPr lang="en-US" sz="3600" i="1" u="sng" dirty="0" smtClean="0">
+                <a:solidFill>
+                  <a:schemeClr val="accent6">
+                    <a:lumMod val="75000"/>
+                  </a:schemeClr>
+                </a:solidFill>
+              </a:rPr>
+              <a:t>look</a:t>
+            </a:r>
+            <a:r>
+              <a:rPr lang="en-US" sz="3600" dirty="0" smtClean="0">
+                <a:solidFill>
+                  <a:schemeClr val="accent6">
+                    <a:lumMod val="75000"/>
+                  </a:schemeClr>
+                </a:solidFill>
+              </a:rPr>
+              <a:t> like a better designer</a:t>
             </a:r>
           </a:p>
         </p:txBody>
@@ -49224,7 +49407,7 @@
             <p:ph idx="1"/>
             <p:extLst>
               <p:ext uri="{D42A27DB-BD31-4B8C-83A1-F6EECF244321}">
-                <p14:modId xmlns:p14="http://schemas.microsoft.com/office/powerpoint/2010/main" val="718636670"/>
+                <p14:modId xmlns:p14="http://schemas.microsoft.com/office/powerpoint/2010/main" val="3147261536"/>
               </p:ext>
             </p:extLst>
           </p:nvPr>
@@ -49312,7 +49495,23 @@
           <a:p>
             <a:r>
               <a:rPr lang="en-US" dirty="0" smtClean="0"/>
-              <a:t>“Now is a great time to be a terrible designer!” </a:t>
+              <a:t>“Now is a </a:t>
+            </a:r>
+            <a:r>
+              <a:rPr lang="en-US" b="1" dirty="0" smtClean="0"/>
+              <a:t>great</a:t>
+            </a:r>
+            <a:r>
+              <a:rPr lang="en-US" dirty="0" smtClean="0"/>
+              <a:t> time to be a </a:t>
+            </a:r>
+            <a:r>
+              <a:rPr lang="en-US" b="1" dirty="0" smtClean="0"/>
+              <a:t>terrible</a:t>
+            </a:r>
+            <a:r>
+              <a:rPr lang="en-US" dirty="0" smtClean="0"/>
+              <a:t> designer!” </a:t>
             </a:r>
             <a:br>
               <a:rPr lang="en-US" dirty="0" smtClean="0"/>

</xml_diff>